<commit_message>
Modify FlowCharts and add images to wiki
</commit_message>
<xml_diff>
--- a/mole-project/SoominLee_mole-diagram_20170724.pptx
+++ b/mole-project/SoominLee_mole-diagram_20170724.pptx
@@ -6,7 +6,8 @@
   </p:sldMasterIdLst>
   <p:sldIdLst>
     <p:sldId id="256" r:id="rId2"/>
-    <p:sldId id="257" r:id="rId3"/>
+    <p:sldId id="258" r:id="rId3"/>
+    <p:sldId id="257" r:id="rId4"/>
   </p:sldIdLst>
   <p:sldSz cx="12192000" cy="6858000"/>
   <p:notesSz cx="6858000" cy="9144000"/>
@@ -244,7 +245,7 @@
           <a:p>
             <a:fld id="{14F71558-F0D8-40DF-AA6C-53A353A00546}" type="datetimeFigureOut">
               <a:rPr lang="ko-KR" altLang="en-US" smtClean="0"/>
-              <a:t>2017-07-24</a:t>
+              <a:t>2017-07-25</a:t>
             </a:fld>
             <a:endParaRPr lang="ko-KR" altLang="en-US"/>
           </a:p>
@@ -414,7 +415,7 @@
           <a:p>
             <a:fld id="{14F71558-F0D8-40DF-AA6C-53A353A00546}" type="datetimeFigureOut">
               <a:rPr lang="ko-KR" altLang="en-US" smtClean="0"/>
-              <a:t>2017-07-24</a:t>
+              <a:t>2017-07-25</a:t>
             </a:fld>
             <a:endParaRPr lang="ko-KR" altLang="en-US"/>
           </a:p>
@@ -594,7 +595,7 @@
           <a:p>
             <a:fld id="{14F71558-F0D8-40DF-AA6C-53A353A00546}" type="datetimeFigureOut">
               <a:rPr lang="ko-KR" altLang="en-US" smtClean="0"/>
-              <a:t>2017-07-24</a:t>
+              <a:t>2017-07-25</a:t>
             </a:fld>
             <a:endParaRPr lang="ko-KR" altLang="en-US"/>
           </a:p>
@@ -764,7 +765,7 @@
           <a:p>
             <a:fld id="{14F71558-F0D8-40DF-AA6C-53A353A00546}" type="datetimeFigureOut">
               <a:rPr lang="ko-KR" altLang="en-US" smtClean="0"/>
-              <a:t>2017-07-24</a:t>
+              <a:t>2017-07-25</a:t>
             </a:fld>
             <a:endParaRPr lang="ko-KR" altLang="en-US"/>
           </a:p>
@@ -1010,7 +1011,7 @@
           <a:p>
             <a:fld id="{14F71558-F0D8-40DF-AA6C-53A353A00546}" type="datetimeFigureOut">
               <a:rPr lang="ko-KR" altLang="en-US" smtClean="0"/>
-              <a:t>2017-07-24</a:t>
+              <a:t>2017-07-25</a:t>
             </a:fld>
             <a:endParaRPr lang="ko-KR" altLang="en-US"/>
           </a:p>
@@ -1242,7 +1243,7 @@
           <a:p>
             <a:fld id="{14F71558-F0D8-40DF-AA6C-53A353A00546}" type="datetimeFigureOut">
               <a:rPr lang="ko-KR" altLang="en-US" smtClean="0"/>
-              <a:t>2017-07-24</a:t>
+              <a:t>2017-07-25</a:t>
             </a:fld>
             <a:endParaRPr lang="ko-KR" altLang="en-US"/>
           </a:p>
@@ -1609,7 +1610,7 @@
           <a:p>
             <a:fld id="{14F71558-F0D8-40DF-AA6C-53A353A00546}" type="datetimeFigureOut">
               <a:rPr lang="ko-KR" altLang="en-US" smtClean="0"/>
-              <a:t>2017-07-24</a:t>
+              <a:t>2017-07-25</a:t>
             </a:fld>
             <a:endParaRPr lang="ko-KR" altLang="en-US"/>
           </a:p>
@@ -1727,7 +1728,7 @@
           <a:p>
             <a:fld id="{14F71558-F0D8-40DF-AA6C-53A353A00546}" type="datetimeFigureOut">
               <a:rPr lang="ko-KR" altLang="en-US" smtClean="0"/>
-              <a:t>2017-07-24</a:t>
+              <a:t>2017-07-25</a:t>
             </a:fld>
             <a:endParaRPr lang="ko-KR" altLang="en-US"/>
           </a:p>
@@ -1822,7 +1823,7 @@
           <a:p>
             <a:fld id="{14F71558-F0D8-40DF-AA6C-53A353A00546}" type="datetimeFigureOut">
               <a:rPr lang="ko-KR" altLang="en-US" smtClean="0"/>
-              <a:t>2017-07-24</a:t>
+              <a:t>2017-07-25</a:t>
             </a:fld>
             <a:endParaRPr lang="ko-KR" altLang="en-US"/>
           </a:p>
@@ -2099,7 +2100,7 @@
           <a:p>
             <a:fld id="{14F71558-F0D8-40DF-AA6C-53A353A00546}" type="datetimeFigureOut">
               <a:rPr lang="ko-KR" altLang="en-US" smtClean="0"/>
-              <a:t>2017-07-24</a:t>
+              <a:t>2017-07-25</a:t>
             </a:fld>
             <a:endParaRPr lang="ko-KR" altLang="en-US"/>
           </a:p>
@@ -2352,7 +2353,7 @@
           <a:p>
             <a:fld id="{14F71558-F0D8-40DF-AA6C-53A353A00546}" type="datetimeFigureOut">
               <a:rPr lang="ko-KR" altLang="en-US" smtClean="0"/>
-              <a:t>2017-07-24</a:t>
+              <a:t>2017-07-25</a:t>
             </a:fld>
             <a:endParaRPr lang="ko-KR" altLang="en-US"/>
           </a:p>
@@ -2565,7 +2566,7 @@
           <a:p>
             <a:fld id="{14F71558-F0D8-40DF-AA6C-53A353A00546}" type="datetimeFigureOut">
               <a:rPr lang="ko-KR" altLang="en-US" smtClean="0"/>
-              <a:t>2017-07-24</a:t>
+              <a:t>2017-07-25</a:t>
             </a:fld>
             <a:endParaRPr lang="ko-KR" altLang="en-US"/>
           </a:p>
@@ -2978,7 +2979,7 @@
         </p:nvSpPr>
         <p:spPr>
           <a:xfrm>
-            <a:off x="4782448" y="2499271"/>
+            <a:off x="5642195" y="2492175"/>
             <a:ext cx="2680447" cy="1461248"/>
           </a:xfrm>
           <a:prstGeom prst="rect">
@@ -3025,7 +3026,7 @@
         </p:nvSpPr>
         <p:spPr>
           <a:xfrm>
-            <a:off x="5665471" y="4875381"/>
+            <a:off x="6525219" y="4942939"/>
             <a:ext cx="914400" cy="914400"/>
           </a:xfrm>
           <a:prstGeom prst="rect">
@@ -3085,7 +3086,7 @@
         </p:nvGrpSpPr>
         <p:grpSpPr>
           <a:xfrm>
-            <a:off x="1611544" y="1981300"/>
+            <a:off x="3399084" y="1971056"/>
             <a:ext cx="1051458" cy="2504451"/>
             <a:chOff x="1001630" y="1782877"/>
             <a:chExt cx="1051458" cy="2504451"/>
@@ -3894,8 +3895,8 @@
         </p:nvCxnSpPr>
         <p:spPr>
           <a:xfrm flipV="1">
-            <a:off x="2663002" y="3229895"/>
-            <a:ext cx="2119446" cy="3631"/>
+            <a:off x="4450542" y="3222799"/>
+            <a:ext cx="1191653" cy="483"/>
           </a:xfrm>
           <a:prstGeom prst="straightConnector1">
             <a:avLst/>
@@ -3930,8 +3931,8 @@
         </p:nvCxnSpPr>
         <p:spPr>
           <a:xfrm>
-            <a:off x="7462895" y="3229895"/>
-            <a:ext cx="2119446" cy="2531"/>
+            <a:off x="8322642" y="3222799"/>
+            <a:ext cx="1259699" cy="9627"/>
           </a:xfrm>
           <a:prstGeom prst="straightConnector1">
             <a:avLst/>
@@ -3965,9 +3966,9 @@
           <p:nvPr/>
         </p:nvCxnSpPr>
         <p:spPr>
-          <a:xfrm flipH="1">
-            <a:off x="6122671" y="3960519"/>
-            <a:ext cx="1" cy="914862"/>
+          <a:xfrm>
+            <a:off x="6982419" y="3953423"/>
+            <a:ext cx="0" cy="989516"/>
           </a:xfrm>
           <a:prstGeom prst="straightConnector1">
             <a:avLst/>
@@ -4014,7 +4015,7 @@
         </p:blipFill>
         <p:spPr bwMode="auto">
           <a:xfrm rot="10800000" flipV="1">
-            <a:off x="973488" y="2042957"/>
+            <a:off x="2761028" y="2032713"/>
             <a:ext cx="663934" cy="663934"/>
           </a:xfrm>
           <a:prstGeom prst="rect">
@@ -4055,7 +4056,7 @@
         </p:blipFill>
         <p:spPr bwMode="auto">
           <a:xfrm rot="10800000" flipV="1">
-            <a:off x="973368" y="2641566"/>
+            <a:off x="2760908" y="2631322"/>
             <a:ext cx="663934" cy="663934"/>
           </a:xfrm>
           <a:prstGeom prst="rect">
@@ -4096,7 +4097,7 @@
         </p:blipFill>
         <p:spPr bwMode="auto">
           <a:xfrm rot="10800000" flipV="1">
-            <a:off x="951881" y="3244490"/>
+            <a:off x="2739421" y="3234246"/>
             <a:ext cx="663934" cy="663934"/>
           </a:xfrm>
           <a:prstGeom prst="rect">
@@ -4137,7 +4138,7 @@
         </p:blipFill>
         <p:spPr bwMode="auto">
           <a:xfrm rot="10800000" flipV="1">
-            <a:off x="950664" y="3883898"/>
+            <a:off x="2738204" y="3873654"/>
             <a:ext cx="663934" cy="663934"/>
           </a:xfrm>
           <a:prstGeom prst="rect">
@@ -4332,7 +4333,7 @@
         </p:blipFill>
         <p:spPr bwMode="auto">
           <a:xfrm>
-            <a:off x="5144826" y="4793430"/>
+            <a:off x="6004574" y="4860988"/>
             <a:ext cx="307734" cy="1078302"/>
           </a:xfrm>
           <a:prstGeom prst="rect">
@@ -4358,7 +4359,7 @@
         </p:nvSpPr>
         <p:spPr>
           <a:xfrm>
-            <a:off x="4546214" y="6013464"/>
+            <a:off x="5405962" y="6081022"/>
             <a:ext cx="3152914" cy="323165"/>
           </a:xfrm>
           <a:prstGeom prst="rect">
@@ -4388,7 +4389,7 @@
         </p:nvSpPr>
         <p:spPr>
           <a:xfrm>
-            <a:off x="5496077" y="359113"/>
+            <a:off x="6355825" y="364576"/>
             <a:ext cx="1253188" cy="1225296"/>
           </a:xfrm>
           <a:prstGeom prst="ellipse">
@@ -4449,9 +4450,9 @@
           <p:nvPr/>
         </p:nvCxnSpPr>
         <p:spPr>
-          <a:xfrm flipH="1" flipV="1">
-            <a:off x="6122671" y="1584409"/>
-            <a:ext cx="1" cy="914862"/>
+          <a:xfrm flipV="1">
+            <a:off x="6982419" y="1589872"/>
+            <a:ext cx="0" cy="902303"/>
           </a:xfrm>
           <a:prstGeom prst="straightConnector1">
             <a:avLst/>
@@ -4498,7 +4499,7 @@
         </p:blipFill>
         <p:spPr bwMode="auto">
           <a:xfrm>
-            <a:off x="4682138" y="592441"/>
+            <a:off x="5541886" y="597904"/>
             <a:ext cx="751491" cy="991968"/>
           </a:xfrm>
           <a:prstGeom prst="rect">
@@ -4516,6 +4517,230 @@
           </a:extLst>
         </p:spPr>
       </p:pic>
+      <p:pic>
+        <p:nvPicPr>
+          <p:cNvPr id="62" name="Picture 2" descr="person icon에 대한 이미지 검색결과"/>
+          <p:cNvPicPr>
+            <a:picLocks noChangeAspect="1" noChangeArrowheads="1"/>
+          </p:cNvPicPr>
+          <p:nvPr/>
+        </p:nvPicPr>
+        <p:blipFill rotWithShape="1">
+          <a:blip r:embed="rId7" cstate="print">
+            <a:extLst>
+              <a:ext uri="{28A0092B-C50C-407E-A947-70E740481C1C}">
+                <a14:useLocalDpi xmlns:a14="http://schemas.microsoft.com/office/drawing/2010/main" val="0"/>
+              </a:ext>
+            </a:extLst>
+          </a:blip>
+          <a:srcRect l="29431" t="7153" r="28876" b="22250"/>
+          <a:stretch/>
+        </p:blipFill>
+        <p:spPr bwMode="auto">
+          <a:xfrm>
+            <a:off x="465042" y="2617231"/>
+            <a:ext cx="1036166" cy="1169686"/>
+          </a:xfrm>
+          <a:prstGeom prst="rect">
+            <a:avLst/>
+          </a:prstGeom>
+          <a:noFill/>
+          <a:extLst>
+            <a:ext uri="{909E8E84-426E-40DD-AFC4-6F175D3DCCD1}">
+              <a14:hiddenFill xmlns:a14="http://schemas.microsoft.com/office/drawing/2010/main">
+                <a:solidFill>
+                  <a:srgbClr val="FFFFFF"/>
+                </a:solidFill>
+              </a14:hiddenFill>
+            </a:ext>
+          </a:extLst>
+        </p:spPr>
+      </p:pic>
+      <p:sp>
+        <p:nvSpPr>
+          <p:cNvPr id="20" name="TextBox 19"/>
+          <p:cNvSpPr txBox="1"/>
+          <p:nvPr/>
+        </p:nvSpPr>
+        <p:spPr>
+          <a:xfrm>
+            <a:off x="652698" y="3741589"/>
+            <a:ext cx="694141" cy="369332"/>
+          </a:xfrm>
+          <a:prstGeom prst="rect">
+            <a:avLst/>
+          </a:prstGeom>
+          <a:noFill/>
+        </p:spPr>
+        <p:txBody>
+          <a:bodyPr wrap="square" rtlCol="0">
+            <a:spAutoFit/>
+          </a:bodyPr>
+          <a:lstStyle/>
+          <a:p>
+            <a:r>
+              <a:rPr lang="en-US" altLang="ko-KR" dirty="0" smtClean="0"/>
+              <a:t>User</a:t>
+            </a:r>
+            <a:endParaRPr lang="ko-KR" altLang="en-US" dirty="0"/>
+          </a:p>
+        </p:txBody>
+      </p:sp>
+      <p:cxnSp>
+        <p:nvCxnSpPr>
+          <p:cNvPr id="22" name="직선 화살표 연결선 21"/>
+          <p:cNvCxnSpPr>
+            <a:stCxn id="62" idx="3"/>
+          </p:cNvCxnSpPr>
+          <p:nvPr/>
+        </p:nvCxnSpPr>
+        <p:spPr>
+          <a:xfrm>
+            <a:off x="1501208" y="3202074"/>
+            <a:ext cx="1245356" cy="7084"/>
+          </a:xfrm>
+          <a:prstGeom prst="straightConnector1">
+            <a:avLst/>
+          </a:prstGeom>
+          <a:ln w="28575">
+            <a:tailEnd type="triangle"/>
+          </a:ln>
+        </p:spPr>
+        <p:style>
+          <a:lnRef idx="1">
+            <a:schemeClr val="dk1"/>
+          </a:lnRef>
+          <a:fillRef idx="0">
+            <a:schemeClr val="dk1"/>
+          </a:fillRef>
+          <a:effectRef idx="0">
+            <a:schemeClr val="dk1"/>
+          </a:effectRef>
+          <a:fontRef idx="minor">
+            <a:schemeClr val="tx1"/>
+          </a:fontRef>
+        </p:style>
+      </p:cxnSp>
+      <p:sp>
+        <p:nvSpPr>
+          <p:cNvPr id="25" name="TextBox 24"/>
+          <p:cNvSpPr txBox="1"/>
+          <p:nvPr/>
+        </p:nvSpPr>
+        <p:spPr>
+          <a:xfrm>
+            <a:off x="10022096" y="1311872"/>
+            <a:ext cx="1322798" cy="369332"/>
+          </a:xfrm>
+          <a:prstGeom prst="rect">
+            <a:avLst/>
+          </a:prstGeom>
+          <a:noFill/>
+        </p:spPr>
+        <p:txBody>
+          <a:bodyPr wrap="none" rtlCol="0">
+            <a:spAutoFit/>
+          </a:bodyPr>
+          <a:lstStyle/>
+          <a:p>
+            <a:r>
+              <a:rPr lang="en-US" altLang="ko-KR" dirty="0" smtClean="0"/>
+              <a:t>Mole : LED</a:t>
+            </a:r>
+            <a:endParaRPr lang="ko-KR" altLang="en-US" dirty="0"/>
+          </a:p>
+        </p:txBody>
+      </p:sp>
+      <p:sp>
+        <p:nvSpPr>
+          <p:cNvPr id="26" name="TextBox 25"/>
+          <p:cNvSpPr txBox="1"/>
+          <p:nvPr/>
+        </p:nvSpPr>
+        <p:spPr>
+          <a:xfrm>
+            <a:off x="7698322" y="772843"/>
+            <a:ext cx="2543645" cy="369332"/>
+          </a:xfrm>
+          <a:prstGeom prst="rect">
+            <a:avLst/>
+          </a:prstGeom>
+          <a:noFill/>
+        </p:spPr>
+        <p:txBody>
+          <a:bodyPr wrap="none" rtlCol="0">
+            <a:spAutoFit/>
+          </a:bodyPr>
+          <a:lstStyle/>
+          <a:p>
+            <a:r>
+              <a:rPr lang="en-US" altLang="ko-KR" dirty="0" smtClean="0"/>
+              <a:t>Remind Catch : Buzzer</a:t>
+            </a:r>
+            <a:endParaRPr lang="ko-KR" altLang="en-US" dirty="0"/>
+          </a:p>
+        </p:txBody>
+      </p:sp>
+      <p:sp>
+        <p:nvSpPr>
+          <p:cNvPr id="27" name="TextBox 26"/>
+          <p:cNvSpPr txBox="1"/>
+          <p:nvPr/>
+        </p:nvSpPr>
+        <p:spPr>
+          <a:xfrm>
+            <a:off x="515812" y="2092451"/>
+            <a:ext cx="2377440" cy="369332"/>
+          </a:xfrm>
+          <a:prstGeom prst="rect">
+            <a:avLst/>
+          </a:prstGeom>
+          <a:noFill/>
+        </p:spPr>
+        <p:txBody>
+          <a:bodyPr wrap="square" rtlCol="0">
+            <a:spAutoFit/>
+          </a:bodyPr>
+          <a:lstStyle/>
+          <a:p>
+            <a:r>
+              <a:rPr lang="en-US" altLang="ko-KR" dirty="0" smtClean="0"/>
+              <a:t>User Input: Buttons</a:t>
+            </a:r>
+            <a:endParaRPr lang="ko-KR" altLang="en-US" dirty="0"/>
+          </a:p>
+        </p:txBody>
+      </p:sp>
+      <p:sp>
+        <p:nvSpPr>
+          <p:cNvPr id="28" name="TextBox 27"/>
+          <p:cNvSpPr txBox="1"/>
+          <p:nvPr/>
+        </p:nvSpPr>
+        <p:spPr>
+          <a:xfrm>
+            <a:off x="2530337" y="5303423"/>
+            <a:ext cx="3367781" cy="369332"/>
+          </a:xfrm>
+          <a:prstGeom prst="rect">
+            <a:avLst/>
+          </a:prstGeom>
+          <a:noFill/>
+        </p:spPr>
+        <p:txBody>
+          <a:bodyPr wrap="none" rtlCol="0">
+            <a:spAutoFit/>
+          </a:bodyPr>
+          <a:lstStyle/>
+          <a:p>
+            <a:r>
+              <a:rPr lang="en-US" altLang="ko-KR" dirty="0" smtClean="0"/>
+              <a:t>Denote Game Level : RGB LED</a:t>
+            </a:r>
+            <a:endParaRPr lang="ko-KR" altLang="en-US" dirty="0"/>
+          </a:p>
+        </p:txBody>
+      </p:sp>
     </p:spTree>
     <p:extLst>
       <p:ext uri="{BB962C8B-B14F-4D97-AF65-F5344CB8AC3E}">
@@ -4555,14 +4780,734 @@
       </p:grpSpPr>
       <p:sp>
         <p:nvSpPr>
-          <p:cNvPr id="4" name="TextBox 3"/>
+          <p:cNvPr id="4" name="직사각형 3"/>
+          <p:cNvSpPr/>
+          <p:nvPr/>
+        </p:nvSpPr>
+        <p:spPr>
+          <a:xfrm>
+            <a:off x="641840" y="219812"/>
+            <a:ext cx="914400" cy="914400"/>
+          </a:xfrm>
+          <a:prstGeom prst="rect">
+            <a:avLst/>
+          </a:prstGeom>
+          <a:solidFill>
+            <a:schemeClr val="accent6">
+              <a:lumMod val="50000"/>
+            </a:schemeClr>
+          </a:solidFill>
+          <a:ln>
+            <a:solidFill>
+              <a:schemeClr val="accent6">
+                <a:lumMod val="50000"/>
+              </a:schemeClr>
+            </a:solidFill>
+          </a:ln>
+        </p:spPr>
+        <p:style>
+          <a:lnRef idx="2">
+            <a:schemeClr val="accent1">
+              <a:shade val="50000"/>
+            </a:schemeClr>
+          </a:lnRef>
+          <a:fillRef idx="1">
+            <a:schemeClr val="accent1"/>
+          </a:fillRef>
+          <a:effectRef idx="0">
+            <a:schemeClr val="accent1"/>
+          </a:effectRef>
+          <a:fontRef idx="minor">
+            <a:schemeClr val="lt1"/>
+          </a:fontRef>
+        </p:style>
+        <p:txBody>
+          <a:bodyPr rtlCol="0" anchor="ctr"/>
+          <a:lstStyle/>
+          <a:p>
+            <a:pPr algn="ctr"/>
+            <a:r>
+              <a:rPr lang="en-US" altLang="ko-KR" dirty="0" smtClean="0"/>
+              <a:t>7/24</a:t>
+            </a:r>
+            <a:endParaRPr lang="ko-KR" altLang="en-US" dirty="0"/>
+          </a:p>
+        </p:txBody>
+      </p:sp>
+      <p:sp>
+        <p:nvSpPr>
+          <p:cNvPr id="5" name="직사각형 4"/>
+          <p:cNvSpPr/>
+          <p:nvPr/>
+        </p:nvSpPr>
+        <p:spPr>
+          <a:xfrm>
+            <a:off x="1556240" y="219812"/>
+            <a:ext cx="914400" cy="914400"/>
+          </a:xfrm>
+          <a:prstGeom prst="rect">
+            <a:avLst/>
+          </a:prstGeom>
+          <a:solidFill>
+            <a:schemeClr val="accent6">
+              <a:lumMod val="50000"/>
+            </a:schemeClr>
+          </a:solidFill>
+          <a:ln>
+            <a:solidFill>
+              <a:schemeClr val="accent6">
+                <a:lumMod val="50000"/>
+              </a:schemeClr>
+            </a:solidFill>
+          </a:ln>
+        </p:spPr>
+        <p:style>
+          <a:lnRef idx="2">
+            <a:schemeClr val="accent1">
+              <a:shade val="50000"/>
+            </a:schemeClr>
+          </a:lnRef>
+          <a:fillRef idx="1">
+            <a:schemeClr val="accent1"/>
+          </a:fillRef>
+          <a:effectRef idx="0">
+            <a:schemeClr val="accent1"/>
+          </a:effectRef>
+          <a:fontRef idx="minor">
+            <a:schemeClr val="lt1"/>
+          </a:fontRef>
+        </p:style>
+        <p:txBody>
+          <a:bodyPr rtlCol="0" anchor="ctr"/>
+          <a:lstStyle/>
+          <a:p>
+            <a:pPr algn="ctr"/>
+            <a:r>
+              <a:rPr lang="en-US" altLang="ko-KR" dirty="0" smtClean="0"/>
+              <a:t>25</a:t>
+            </a:r>
+            <a:endParaRPr lang="ko-KR" altLang="en-US" dirty="0"/>
+          </a:p>
+        </p:txBody>
+      </p:sp>
+      <p:sp>
+        <p:nvSpPr>
+          <p:cNvPr id="6" name="직사각형 5"/>
+          <p:cNvSpPr/>
+          <p:nvPr/>
+        </p:nvSpPr>
+        <p:spPr>
+          <a:xfrm>
+            <a:off x="2470640" y="219812"/>
+            <a:ext cx="914400" cy="914400"/>
+          </a:xfrm>
+          <a:prstGeom prst="rect">
+            <a:avLst/>
+          </a:prstGeom>
+          <a:solidFill>
+            <a:schemeClr val="accent6">
+              <a:lumMod val="50000"/>
+            </a:schemeClr>
+          </a:solidFill>
+          <a:ln>
+            <a:solidFill>
+              <a:schemeClr val="accent6">
+                <a:lumMod val="50000"/>
+              </a:schemeClr>
+            </a:solidFill>
+          </a:ln>
+        </p:spPr>
+        <p:style>
+          <a:lnRef idx="2">
+            <a:schemeClr val="accent1">
+              <a:shade val="50000"/>
+            </a:schemeClr>
+          </a:lnRef>
+          <a:fillRef idx="1">
+            <a:schemeClr val="accent1"/>
+          </a:fillRef>
+          <a:effectRef idx="0">
+            <a:schemeClr val="accent1"/>
+          </a:effectRef>
+          <a:fontRef idx="minor">
+            <a:schemeClr val="lt1"/>
+          </a:fontRef>
+        </p:style>
+        <p:txBody>
+          <a:bodyPr rtlCol="0" anchor="ctr"/>
+          <a:lstStyle/>
+          <a:p>
+            <a:pPr algn="ctr"/>
+            <a:r>
+              <a:rPr lang="en-US" altLang="ko-KR" dirty="0" smtClean="0"/>
+              <a:t>26</a:t>
+            </a:r>
+            <a:endParaRPr lang="ko-KR" altLang="en-US" dirty="0"/>
+          </a:p>
+        </p:txBody>
+      </p:sp>
+      <p:sp>
+        <p:nvSpPr>
+          <p:cNvPr id="7" name="직사각형 6"/>
+          <p:cNvSpPr/>
+          <p:nvPr/>
+        </p:nvSpPr>
+        <p:spPr>
+          <a:xfrm>
+            <a:off x="3385040" y="219812"/>
+            <a:ext cx="914400" cy="914400"/>
+          </a:xfrm>
+          <a:prstGeom prst="rect">
+            <a:avLst/>
+          </a:prstGeom>
+          <a:solidFill>
+            <a:schemeClr val="accent6">
+              <a:lumMod val="50000"/>
+            </a:schemeClr>
+          </a:solidFill>
+          <a:ln>
+            <a:solidFill>
+              <a:schemeClr val="accent6">
+                <a:lumMod val="50000"/>
+              </a:schemeClr>
+            </a:solidFill>
+          </a:ln>
+        </p:spPr>
+        <p:style>
+          <a:lnRef idx="2">
+            <a:schemeClr val="accent1">
+              <a:shade val="50000"/>
+            </a:schemeClr>
+          </a:lnRef>
+          <a:fillRef idx="1">
+            <a:schemeClr val="accent1"/>
+          </a:fillRef>
+          <a:effectRef idx="0">
+            <a:schemeClr val="accent1"/>
+          </a:effectRef>
+          <a:fontRef idx="minor">
+            <a:schemeClr val="lt1"/>
+          </a:fontRef>
+        </p:style>
+        <p:txBody>
+          <a:bodyPr rtlCol="0" anchor="ctr"/>
+          <a:lstStyle/>
+          <a:p>
+            <a:pPr algn="ctr"/>
+            <a:r>
+              <a:rPr lang="en-US" altLang="ko-KR" dirty="0" smtClean="0"/>
+              <a:t>27</a:t>
+            </a:r>
+            <a:endParaRPr lang="ko-KR" altLang="en-US" dirty="0"/>
+          </a:p>
+        </p:txBody>
+      </p:sp>
+      <p:sp>
+        <p:nvSpPr>
+          <p:cNvPr id="8" name="직사각형 7"/>
+          <p:cNvSpPr/>
+          <p:nvPr/>
+        </p:nvSpPr>
+        <p:spPr>
+          <a:xfrm>
+            <a:off x="4299440" y="219812"/>
+            <a:ext cx="914400" cy="914400"/>
+          </a:xfrm>
+          <a:prstGeom prst="rect">
+            <a:avLst/>
+          </a:prstGeom>
+          <a:solidFill>
+            <a:schemeClr val="accent6">
+              <a:lumMod val="50000"/>
+            </a:schemeClr>
+          </a:solidFill>
+          <a:ln>
+            <a:solidFill>
+              <a:schemeClr val="accent6">
+                <a:lumMod val="50000"/>
+              </a:schemeClr>
+            </a:solidFill>
+          </a:ln>
+        </p:spPr>
+        <p:style>
+          <a:lnRef idx="2">
+            <a:schemeClr val="accent1">
+              <a:shade val="50000"/>
+            </a:schemeClr>
+          </a:lnRef>
+          <a:fillRef idx="1">
+            <a:schemeClr val="accent1"/>
+          </a:fillRef>
+          <a:effectRef idx="0">
+            <a:schemeClr val="accent1"/>
+          </a:effectRef>
+          <a:fontRef idx="minor">
+            <a:schemeClr val="lt1"/>
+          </a:fontRef>
+        </p:style>
+        <p:txBody>
+          <a:bodyPr rtlCol="0" anchor="ctr"/>
+          <a:lstStyle/>
+          <a:p>
+            <a:pPr algn="ctr"/>
+            <a:r>
+              <a:rPr lang="en-US" altLang="ko-KR" dirty="0" smtClean="0"/>
+              <a:t>28</a:t>
+            </a:r>
+            <a:endParaRPr lang="ko-KR" altLang="en-US" dirty="0"/>
+          </a:p>
+        </p:txBody>
+      </p:sp>
+      <p:sp>
+        <p:nvSpPr>
+          <p:cNvPr id="9" name="직사각형 8"/>
+          <p:cNvSpPr/>
+          <p:nvPr/>
+        </p:nvSpPr>
+        <p:spPr>
+          <a:xfrm>
+            <a:off x="5213840" y="219812"/>
+            <a:ext cx="914400" cy="914400"/>
+          </a:xfrm>
+          <a:prstGeom prst="rect">
+            <a:avLst/>
+          </a:prstGeom>
+          <a:solidFill>
+            <a:schemeClr val="accent6">
+              <a:lumMod val="50000"/>
+            </a:schemeClr>
+          </a:solidFill>
+          <a:ln>
+            <a:solidFill>
+              <a:schemeClr val="accent6">
+                <a:lumMod val="50000"/>
+              </a:schemeClr>
+            </a:solidFill>
+          </a:ln>
+        </p:spPr>
+        <p:style>
+          <a:lnRef idx="2">
+            <a:schemeClr val="accent1">
+              <a:shade val="50000"/>
+            </a:schemeClr>
+          </a:lnRef>
+          <a:fillRef idx="1">
+            <a:schemeClr val="accent1"/>
+          </a:fillRef>
+          <a:effectRef idx="0">
+            <a:schemeClr val="accent1"/>
+          </a:effectRef>
+          <a:fontRef idx="minor">
+            <a:schemeClr val="lt1"/>
+          </a:fontRef>
+        </p:style>
+        <p:txBody>
+          <a:bodyPr rtlCol="0" anchor="ctr"/>
+          <a:lstStyle/>
+          <a:p>
+            <a:pPr algn="ctr"/>
+            <a:r>
+              <a:rPr lang="en-US" altLang="ko-KR" dirty="0" smtClean="0"/>
+              <a:t>29</a:t>
+            </a:r>
+            <a:endParaRPr lang="ko-KR" altLang="en-US" dirty="0"/>
+          </a:p>
+        </p:txBody>
+      </p:sp>
+      <p:sp>
+        <p:nvSpPr>
+          <p:cNvPr id="10" name="직사각형 9"/>
+          <p:cNvSpPr/>
+          <p:nvPr/>
+        </p:nvSpPr>
+        <p:spPr>
+          <a:xfrm>
+            <a:off x="6128240" y="219812"/>
+            <a:ext cx="914400" cy="914400"/>
+          </a:xfrm>
+          <a:prstGeom prst="rect">
+            <a:avLst/>
+          </a:prstGeom>
+          <a:solidFill>
+            <a:schemeClr val="accent6">
+              <a:lumMod val="50000"/>
+            </a:schemeClr>
+          </a:solidFill>
+          <a:ln>
+            <a:solidFill>
+              <a:schemeClr val="accent6">
+                <a:lumMod val="50000"/>
+              </a:schemeClr>
+            </a:solidFill>
+          </a:ln>
+        </p:spPr>
+        <p:style>
+          <a:lnRef idx="2">
+            <a:schemeClr val="accent1">
+              <a:shade val="50000"/>
+            </a:schemeClr>
+          </a:lnRef>
+          <a:fillRef idx="1">
+            <a:schemeClr val="accent1"/>
+          </a:fillRef>
+          <a:effectRef idx="0">
+            <a:schemeClr val="accent1"/>
+          </a:effectRef>
+          <a:fontRef idx="minor">
+            <a:schemeClr val="lt1"/>
+          </a:fontRef>
+        </p:style>
+        <p:txBody>
+          <a:bodyPr rtlCol="0" anchor="ctr"/>
+          <a:lstStyle/>
+          <a:p>
+            <a:pPr algn="ctr"/>
+            <a:r>
+              <a:rPr lang="en-US" altLang="ko-KR" dirty="0" smtClean="0"/>
+              <a:t>30</a:t>
+            </a:r>
+            <a:endParaRPr lang="ko-KR" altLang="en-US" dirty="0"/>
+          </a:p>
+        </p:txBody>
+      </p:sp>
+      <p:sp>
+        <p:nvSpPr>
+          <p:cNvPr id="11" name="직사각형 10"/>
+          <p:cNvSpPr/>
+          <p:nvPr/>
+        </p:nvSpPr>
+        <p:spPr>
+          <a:xfrm>
+            <a:off x="7042640" y="219812"/>
+            <a:ext cx="914400" cy="914400"/>
+          </a:xfrm>
+          <a:prstGeom prst="rect">
+            <a:avLst/>
+          </a:prstGeom>
+          <a:solidFill>
+            <a:schemeClr val="accent6">
+              <a:lumMod val="50000"/>
+            </a:schemeClr>
+          </a:solidFill>
+          <a:ln>
+            <a:solidFill>
+              <a:schemeClr val="accent6">
+                <a:lumMod val="50000"/>
+              </a:schemeClr>
+            </a:solidFill>
+          </a:ln>
+        </p:spPr>
+        <p:style>
+          <a:lnRef idx="2">
+            <a:schemeClr val="accent1">
+              <a:shade val="50000"/>
+            </a:schemeClr>
+          </a:lnRef>
+          <a:fillRef idx="1">
+            <a:schemeClr val="accent1"/>
+          </a:fillRef>
+          <a:effectRef idx="0">
+            <a:schemeClr val="accent1"/>
+          </a:effectRef>
+          <a:fontRef idx="minor">
+            <a:schemeClr val="lt1"/>
+          </a:fontRef>
+        </p:style>
+        <p:txBody>
+          <a:bodyPr rtlCol="0" anchor="ctr"/>
+          <a:lstStyle/>
+          <a:p>
+            <a:pPr algn="ctr"/>
+            <a:r>
+              <a:rPr lang="en-US" altLang="ko-KR" dirty="0" smtClean="0"/>
+              <a:t>31</a:t>
+            </a:r>
+            <a:endParaRPr lang="ko-KR" altLang="en-US" dirty="0"/>
+          </a:p>
+        </p:txBody>
+      </p:sp>
+      <p:sp>
+        <p:nvSpPr>
+          <p:cNvPr id="12" name="직사각형 11"/>
+          <p:cNvSpPr/>
+          <p:nvPr/>
+        </p:nvSpPr>
+        <p:spPr>
+          <a:xfrm>
+            <a:off x="7957040" y="219812"/>
+            <a:ext cx="914400" cy="914400"/>
+          </a:xfrm>
+          <a:prstGeom prst="rect">
+            <a:avLst/>
+          </a:prstGeom>
+          <a:solidFill>
+            <a:schemeClr val="accent6">
+              <a:lumMod val="50000"/>
+            </a:schemeClr>
+          </a:solidFill>
+          <a:ln>
+            <a:solidFill>
+              <a:schemeClr val="accent6">
+                <a:lumMod val="50000"/>
+              </a:schemeClr>
+            </a:solidFill>
+          </a:ln>
+        </p:spPr>
+        <p:style>
+          <a:lnRef idx="2">
+            <a:schemeClr val="accent1">
+              <a:shade val="50000"/>
+            </a:schemeClr>
+          </a:lnRef>
+          <a:fillRef idx="1">
+            <a:schemeClr val="accent1"/>
+          </a:fillRef>
+          <a:effectRef idx="0">
+            <a:schemeClr val="accent1"/>
+          </a:effectRef>
+          <a:fontRef idx="minor">
+            <a:schemeClr val="lt1"/>
+          </a:fontRef>
+        </p:style>
+        <p:txBody>
+          <a:bodyPr rtlCol="0" anchor="ctr"/>
+          <a:lstStyle/>
+          <a:p>
+            <a:pPr algn="ctr"/>
+            <a:r>
+              <a:rPr lang="en-US" altLang="ko-KR" dirty="0" smtClean="0"/>
+              <a:t>8/1</a:t>
+            </a:r>
+            <a:endParaRPr lang="ko-KR" altLang="en-US" dirty="0"/>
+          </a:p>
+        </p:txBody>
+      </p:sp>
+      <p:sp>
+        <p:nvSpPr>
+          <p:cNvPr id="13" name="직사각형 12"/>
+          <p:cNvSpPr/>
+          <p:nvPr/>
+        </p:nvSpPr>
+        <p:spPr>
+          <a:xfrm>
+            <a:off x="8871440" y="219812"/>
+            <a:ext cx="914400" cy="914400"/>
+          </a:xfrm>
+          <a:prstGeom prst="rect">
+            <a:avLst/>
+          </a:prstGeom>
+          <a:solidFill>
+            <a:schemeClr val="accent6">
+              <a:lumMod val="50000"/>
+            </a:schemeClr>
+          </a:solidFill>
+          <a:ln>
+            <a:solidFill>
+              <a:schemeClr val="accent6">
+                <a:lumMod val="50000"/>
+              </a:schemeClr>
+            </a:solidFill>
+          </a:ln>
+        </p:spPr>
+        <p:style>
+          <a:lnRef idx="2">
+            <a:schemeClr val="accent1">
+              <a:shade val="50000"/>
+            </a:schemeClr>
+          </a:lnRef>
+          <a:fillRef idx="1">
+            <a:schemeClr val="accent1"/>
+          </a:fillRef>
+          <a:effectRef idx="0">
+            <a:schemeClr val="accent1"/>
+          </a:effectRef>
+          <a:fontRef idx="minor">
+            <a:schemeClr val="lt1"/>
+          </a:fontRef>
+        </p:style>
+        <p:txBody>
+          <a:bodyPr rtlCol="0" anchor="ctr"/>
+          <a:lstStyle/>
+          <a:p>
+            <a:pPr algn="ctr"/>
+            <a:r>
+              <a:rPr lang="en-US" altLang="ko-KR" dirty="0" smtClean="0"/>
+              <a:t>2</a:t>
+            </a:r>
+            <a:endParaRPr lang="ko-KR" altLang="en-US" dirty="0"/>
+          </a:p>
+        </p:txBody>
+      </p:sp>
+      <p:sp>
+        <p:nvSpPr>
+          <p:cNvPr id="14" name="직사각형 13"/>
+          <p:cNvSpPr/>
+          <p:nvPr/>
+        </p:nvSpPr>
+        <p:spPr>
+          <a:xfrm>
+            <a:off x="9785840" y="219812"/>
+            <a:ext cx="914400" cy="914400"/>
+          </a:xfrm>
+          <a:prstGeom prst="rect">
+            <a:avLst/>
+          </a:prstGeom>
+          <a:solidFill>
+            <a:schemeClr val="accent6">
+              <a:lumMod val="50000"/>
+            </a:schemeClr>
+          </a:solidFill>
+          <a:ln>
+            <a:solidFill>
+              <a:schemeClr val="accent6">
+                <a:lumMod val="50000"/>
+              </a:schemeClr>
+            </a:solidFill>
+          </a:ln>
+        </p:spPr>
+        <p:style>
+          <a:lnRef idx="2">
+            <a:schemeClr val="accent1">
+              <a:shade val="50000"/>
+            </a:schemeClr>
+          </a:lnRef>
+          <a:fillRef idx="1">
+            <a:schemeClr val="accent1"/>
+          </a:fillRef>
+          <a:effectRef idx="0">
+            <a:schemeClr val="accent1"/>
+          </a:effectRef>
+          <a:fontRef idx="minor">
+            <a:schemeClr val="lt1"/>
+          </a:fontRef>
+        </p:style>
+        <p:txBody>
+          <a:bodyPr rtlCol="0" anchor="ctr"/>
+          <a:lstStyle/>
+          <a:p>
+            <a:pPr algn="ctr"/>
+            <a:r>
+              <a:rPr lang="en-US" altLang="ko-KR" dirty="0" smtClean="0"/>
+              <a:t>3</a:t>
+            </a:r>
+            <a:endParaRPr lang="ko-KR" altLang="en-US" dirty="0"/>
+          </a:p>
+        </p:txBody>
+      </p:sp>
+      <p:sp>
+        <p:nvSpPr>
+          <p:cNvPr id="15" name="직사각형 14"/>
+          <p:cNvSpPr/>
+          <p:nvPr/>
+        </p:nvSpPr>
+        <p:spPr>
+          <a:xfrm>
+            <a:off x="10700240" y="219812"/>
+            <a:ext cx="914400" cy="914400"/>
+          </a:xfrm>
+          <a:prstGeom prst="rect">
+            <a:avLst/>
+          </a:prstGeom>
+          <a:solidFill>
+            <a:schemeClr val="accent6">
+              <a:lumMod val="50000"/>
+            </a:schemeClr>
+          </a:solidFill>
+          <a:ln>
+            <a:solidFill>
+              <a:schemeClr val="accent6">
+                <a:lumMod val="50000"/>
+              </a:schemeClr>
+            </a:solidFill>
+          </a:ln>
+        </p:spPr>
+        <p:style>
+          <a:lnRef idx="2">
+            <a:schemeClr val="accent1">
+              <a:shade val="50000"/>
+            </a:schemeClr>
+          </a:lnRef>
+          <a:fillRef idx="1">
+            <a:schemeClr val="accent1"/>
+          </a:fillRef>
+          <a:effectRef idx="0">
+            <a:schemeClr val="accent1"/>
+          </a:effectRef>
+          <a:fontRef idx="minor">
+            <a:schemeClr val="lt1"/>
+          </a:fontRef>
+        </p:style>
+        <p:txBody>
+          <a:bodyPr rtlCol="0" anchor="ctr"/>
+          <a:lstStyle/>
+          <a:p>
+            <a:pPr algn="ctr"/>
+            <a:r>
+              <a:rPr lang="en-US" altLang="ko-KR" dirty="0" smtClean="0"/>
+              <a:t>4</a:t>
+            </a:r>
+            <a:endParaRPr lang="ko-KR" altLang="en-US" dirty="0"/>
+          </a:p>
+        </p:txBody>
+      </p:sp>
+      <p:sp>
+        <p:nvSpPr>
+          <p:cNvPr id="16" name="직사각형 15"/>
+          <p:cNvSpPr/>
+          <p:nvPr/>
+        </p:nvSpPr>
+        <p:spPr>
+          <a:xfrm>
+            <a:off x="641840" y="2609874"/>
+            <a:ext cx="914400" cy="914400"/>
+          </a:xfrm>
+          <a:prstGeom prst="rect">
+            <a:avLst/>
+          </a:prstGeom>
+          <a:solidFill>
+            <a:srgbClr val="FFFF00"/>
+          </a:solidFill>
+          <a:ln>
+            <a:solidFill>
+              <a:srgbClr val="FFFF00"/>
+            </a:solidFill>
+          </a:ln>
+        </p:spPr>
+        <p:style>
+          <a:lnRef idx="2">
+            <a:schemeClr val="accent1">
+              <a:shade val="50000"/>
+            </a:schemeClr>
+          </a:lnRef>
+          <a:fillRef idx="1">
+            <a:schemeClr val="accent1"/>
+          </a:fillRef>
+          <a:effectRef idx="0">
+            <a:schemeClr val="accent1"/>
+          </a:effectRef>
+          <a:fontRef idx="minor">
+            <a:schemeClr val="lt1"/>
+          </a:fontRef>
+        </p:style>
+        <p:txBody>
+          <a:bodyPr rtlCol="0" anchor="ctr"/>
+          <a:lstStyle/>
+          <a:p>
+            <a:pPr algn="ctr"/>
+            <a:endParaRPr lang="ko-KR" altLang="en-US"/>
+          </a:p>
+        </p:txBody>
+      </p:sp>
+      <p:sp>
+        <p:nvSpPr>
+          <p:cNvPr id="17" name="TextBox 16"/>
           <p:cNvSpPr txBox="1"/>
           <p:nvPr/>
         </p:nvSpPr>
         <p:spPr>
           <a:xfrm>
-            <a:off x="931652" y="577970"/>
-            <a:ext cx="1189749" cy="369332"/>
+            <a:off x="1684741" y="2882408"/>
+            <a:ext cx="6143798" cy="369332"/>
           </a:xfrm>
           <a:prstGeom prst="rect">
             <a:avLst/>
@@ -4576,23 +5521,91 @@
           <a:lstStyle/>
           <a:p>
             <a:r>
-              <a:rPr lang="ko-KR" altLang="en-US" smtClean="0"/>
-              <a:t>작동 과정</a:t>
-            </a:r>
+              <a:rPr lang="en-US" altLang="ko-KR" dirty="0" smtClean="0"/>
+              <a:t>ATmega32U4 </a:t>
+            </a:r>
+            <a:r>
+              <a:rPr lang="ko-KR" altLang="en-US" dirty="0" smtClean="0"/>
+              <a:t>이해</a:t>
+            </a:r>
+            <a:r>
+              <a:rPr lang="en-US" altLang="ko-KR" dirty="0" smtClean="0"/>
+              <a:t>, DK-AVR </a:t>
+            </a:r>
+            <a:r>
+              <a:rPr lang="ko-KR" altLang="en-US" dirty="0" smtClean="0"/>
+              <a:t>이해와 개발환경 구축</a:t>
+            </a:r>
+            <a:r>
+              <a:rPr lang="en-US" altLang="ko-KR" dirty="0" smtClean="0"/>
+              <a:t>,</a:t>
+            </a:r>
+            <a:r>
+              <a:rPr lang="ko-KR" altLang="en-US" dirty="0" smtClean="0"/>
+              <a:t> 테스트</a:t>
+            </a:r>
+            <a:endParaRPr lang="ko-KR" altLang="en-US" dirty="0"/>
+          </a:p>
+        </p:txBody>
+      </p:sp>
+      <p:sp>
+        <p:nvSpPr>
+          <p:cNvPr id="18" name="직사각형 17"/>
+          <p:cNvSpPr/>
+          <p:nvPr/>
+        </p:nvSpPr>
+        <p:spPr>
+          <a:xfrm>
+            <a:off x="641840" y="4044434"/>
+            <a:ext cx="914400" cy="914400"/>
+          </a:xfrm>
+          <a:prstGeom prst="rect">
+            <a:avLst/>
+          </a:prstGeom>
+          <a:solidFill>
+            <a:srgbClr val="00B050"/>
+          </a:solidFill>
+          <a:ln>
+            <a:solidFill>
+              <a:srgbClr val="00B050"/>
+            </a:solidFill>
+          </a:ln>
+        </p:spPr>
+        <p:style>
+          <a:lnRef idx="2">
+            <a:schemeClr val="accent1">
+              <a:shade val="50000"/>
+            </a:schemeClr>
+          </a:lnRef>
+          <a:fillRef idx="1">
+            <a:schemeClr val="accent1"/>
+          </a:fillRef>
+          <a:effectRef idx="0">
+            <a:schemeClr val="accent1"/>
+          </a:effectRef>
+          <a:fontRef idx="minor">
+            <a:schemeClr val="lt1"/>
+          </a:fontRef>
+        </p:style>
+        <p:txBody>
+          <a:bodyPr rtlCol="0" anchor="ctr"/>
+          <a:lstStyle/>
+          <a:p>
+            <a:pPr algn="ctr"/>
             <a:endParaRPr lang="ko-KR" altLang="en-US"/>
           </a:p>
         </p:txBody>
       </p:sp>
       <p:sp>
         <p:nvSpPr>
-          <p:cNvPr id="5" name="TextBox 4"/>
+          <p:cNvPr id="19" name="TextBox 18"/>
           <p:cNvSpPr txBox="1"/>
           <p:nvPr/>
         </p:nvSpPr>
         <p:spPr>
           <a:xfrm>
-            <a:off x="931652" y="1329312"/>
-            <a:ext cx="6625532" cy="3970318"/>
+            <a:off x="1684741" y="4316968"/>
+            <a:ext cx="3020379" cy="369332"/>
           </a:xfrm>
           <a:prstGeom prst="rect">
             <a:avLst/>
@@ -4606,6 +5619,668 @@
           <a:lstStyle/>
           <a:p>
             <a:r>
+              <a:rPr lang="ko-KR" altLang="en-US" dirty="0" smtClean="0"/>
+              <a:t>다이어그램 작성</a:t>
+            </a:r>
+            <a:r>
+              <a:rPr lang="en-US" altLang="ko-KR" dirty="0" smtClean="0"/>
+              <a:t>, </a:t>
+            </a:r>
+            <a:r>
+              <a:rPr lang="ko-KR" altLang="en-US" dirty="0" smtClean="0"/>
+              <a:t>흐름 설계</a:t>
+            </a:r>
+            <a:endParaRPr lang="ko-KR" altLang="en-US" dirty="0"/>
+          </a:p>
+        </p:txBody>
+      </p:sp>
+      <p:sp>
+        <p:nvSpPr>
+          <p:cNvPr id="20" name="직사각형 19"/>
+          <p:cNvSpPr/>
+          <p:nvPr/>
+        </p:nvSpPr>
+        <p:spPr>
+          <a:xfrm>
+            <a:off x="6128240" y="4044434"/>
+            <a:ext cx="914400" cy="914400"/>
+          </a:xfrm>
+          <a:prstGeom prst="rect">
+            <a:avLst/>
+          </a:prstGeom>
+          <a:solidFill>
+            <a:srgbClr val="00B0F0"/>
+          </a:solidFill>
+          <a:ln>
+            <a:solidFill>
+              <a:srgbClr val="00B0F0"/>
+            </a:solidFill>
+          </a:ln>
+        </p:spPr>
+        <p:style>
+          <a:lnRef idx="2">
+            <a:schemeClr val="accent1">
+              <a:shade val="50000"/>
+            </a:schemeClr>
+          </a:lnRef>
+          <a:fillRef idx="1">
+            <a:schemeClr val="accent1"/>
+          </a:fillRef>
+          <a:effectRef idx="0">
+            <a:schemeClr val="accent1"/>
+          </a:effectRef>
+          <a:fontRef idx="minor">
+            <a:schemeClr val="lt1"/>
+          </a:fontRef>
+        </p:style>
+        <p:txBody>
+          <a:bodyPr rtlCol="0" anchor="ctr"/>
+          <a:lstStyle/>
+          <a:p>
+            <a:pPr algn="ctr"/>
+            <a:endParaRPr lang="ko-KR" altLang="en-US"/>
+          </a:p>
+        </p:txBody>
+      </p:sp>
+      <p:sp>
+        <p:nvSpPr>
+          <p:cNvPr id="21" name="TextBox 20"/>
+          <p:cNvSpPr txBox="1"/>
+          <p:nvPr/>
+        </p:nvSpPr>
+        <p:spPr>
+          <a:xfrm>
+            <a:off x="7197519" y="4316968"/>
+            <a:ext cx="1963999" cy="369332"/>
+          </a:xfrm>
+          <a:prstGeom prst="rect">
+            <a:avLst/>
+          </a:prstGeom>
+          <a:noFill/>
+        </p:spPr>
+        <p:txBody>
+          <a:bodyPr wrap="none" rtlCol="0">
+            <a:spAutoFit/>
+          </a:bodyPr>
+          <a:lstStyle/>
+          <a:p>
+            <a:r>
+              <a:rPr lang="ko-KR" altLang="en-US" dirty="0" smtClean="0"/>
+              <a:t>회로 설계와 제작</a:t>
+            </a:r>
+            <a:endParaRPr lang="ko-KR" altLang="en-US" dirty="0"/>
+          </a:p>
+        </p:txBody>
+      </p:sp>
+      <p:sp>
+        <p:nvSpPr>
+          <p:cNvPr id="22" name="직사각형 21"/>
+          <p:cNvSpPr/>
+          <p:nvPr/>
+        </p:nvSpPr>
+        <p:spPr>
+          <a:xfrm>
+            <a:off x="641840" y="5454086"/>
+            <a:ext cx="914400" cy="914400"/>
+          </a:xfrm>
+          <a:prstGeom prst="rect">
+            <a:avLst/>
+          </a:prstGeom>
+          <a:solidFill>
+            <a:srgbClr val="7030A0"/>
+          </a:solidFill>
+          <a:ln>
+            <a:solidFill>
+              <a:srgbClr val="7030A0"/>
+            </a:solidFill>
+          </a:ln>
+        </p:spPr>
+        <p:style>
+          <a:lnRef idx="2">
+            <a:schemeClr val="accent1">
+              <a:shade val="50000"/>
+            </a:schemeClr>
+          </a:lnRef>
+          <a:fillRef idx="1">
+            <a:schemeClr val="accent1"/>
+          </a:fillRef>
+          <a:effectRef idx="0">
+            <a:schemeClr val="accent1"/>
+          </a:effectRef>
+          <a:fontRef idx="minor">
+            <a:schemeClr val="lt1"/>
+          </a:fontRef>
+        </p:style>
+        <p:txBody>
+          <a:bodyPr rtlCol="0" anchor="ctr"/>
+          <a:lstStyle/>
+          <a:p>
+            <a:pPr algn="ctr"/>
+            <a:endParaRPr lang="ko-KR" altLang="en-US"/>
+          </a:p>
+        </p:txBody>
+      </p:sp>
+      <p:sp>
+        <p:nvSpPr>
+          <p:cNvPr id="23" name="TextBox 22"/>
+          <p:cNvSpPr txBox="1"/>
+          <p:nvPr/>
+        </p:nvSpPr>
+        <p:spPr>
+          <a:xfrm>
+            <a:off x="1711119" y="5726620"/>
+            <a:ext cx="2194832" cy="369332"/>
+          </a:xfrm>
+          <a:prstGeom prst="rect">
+            <a:avLst/>
+          </a:prstGeom>
+          <a:noFill/>
+        </p:spPr>
+        <p:txBody>
+          <a:bodyPr wrap="none" rtlCol="0">
+            <a:spAutoFit/>
+          </a:bodyPr>
+          <a:lstStyle/>
+          <a:p>
+            <a:r>
+              <a:rPr lang="ko-KR" altLang="en-US" dirty="0" smtClean="0"/>
+              <a:t>코드 작성</a:t>
+            </a:r>
+            <a:r>
+              <a:rPr lang="ko-KR" altLang="en-US" dirty="0"/>
+              <a:t>과</a:t>
+            </a:r>
+            <a:r>
+              <a:rPr lang="en-US" altLang="ko-KR" dirty="0" smtClean="0"/>
+              <a:t> </a:t>
+            </a:r>
+            <a:r>
+              <a:rPr lang="ko-KR" altLang="en-US" dirty="0" smtClean="0"/>
+              <a:t>디버깅</a:t>
+            </a:r>
+            <a:endParaRPr lang="ko-KR" altLang="en-US" dirty="0"/>
+          </a:p>
+        </p:txBody>
+      </p:sp>
+      <p:sp>
+        <p:nvSpPr>
+          <p:cNvPr id="24" name="직사각형 23"/>
+          <p:cNvSpPr/>
+          <p:nvPr/>
+        </p:nvSpPr>
+        <p:spPr>
+          <a:xfrm>
+            <a:off x="6128240" y="5454086"/>
+            <a:ext cx="914400" cy="914400"/>
+          </a:xfrm>
+          <a:prstGeom prst="rect">
+            <a:avLst/>
+          </a:prstGeom>
+          <a:solidFill>
+            <a:schemeClr val="accent2">
+              <a:lumMod val="50000"/>
+            </a:schemeClr>
+          </a:solidFill>
+          <a:ln>
+            <a:solidFill>
+              <a:schemeClr val="accent2">
+                <a:lumMod val="50000"/>
+              </a:schemeClr>
+            </a:solidFill>
+          </a:ln>
+        </p:spPr>
+        <p:style>
+          <a:lnRef idx="2">
+            <a:schemeClr val="accent1">
+              <a:shade val="50000"/>
+            </a:schemeClr>
+          </a:lnRef>
+          <a:fillRef idx="1">
+            <a:schemeClr val="accent1"/>
+          </a:fillRef>
+          <a:effectRef idx="0">
+            <a:schemeClr val="accent1"/>
+          </a:effectRef>
+          <a:fontRef idx="minor">
+            <a:schemeClr val="lt1"/>
+          </a:fontRef>
+        </p:style>
+        <p:txBody>
+          <a:bodyPr rtlCol="0" anchor="ctr"/>
+          <a:lstStyle/>
+          <a:p>
+            <a:pPr algn="ctr"/>
+            <a:endParaRPr lang="ko-KR" altLang="en-US"/>
+          </a:p>
+        </p:txBody>
+      </p:sp>
+      <p:sp>
+        <p:nvSpPr>
+          <p:cNvPr id="25" name="TextBox 24"/>
+          <p:cNvSpPr txBox="1"/>
+          <p:nvPr/>
+        </p:nvSpPr>
+        <p:spPr>
+          <a:xfrm>
+            <a:off x="7197519" y="5726620"/>
+            <a:ext cx="4650632" cy="369332"/>
+          </a:xfrm>
+          <a:prstGeom prst="rect">
+            <a:avLst/>
+          </a:prstGeom>
+          <a:noFill/>
+        </p:spPr>
+        <p:txBody>
+          <a:bodyPr wrap="none" rtlCol="0">
+            <a:spAutoFit/>
+          </a:bodyPr>
+          <a:lstStyle/>
+          <a:p>
+            <a:r>
+              <a:rPr lang="ko-KR" altLang="en-US" dirty="0" smtClean="0"/>
+              <a:t>구현 테스트와 최종 보고서 작성</a:t>
+            </a:r>
+            <a:r>
+              <a:rPr lang="en-US" altLang="ko-KR" dirty="0" smtClean="0"/>
+              <a:t>, </a:t>
+            </a:r>
+            <a:r>
+              <a:rPr lang="ko-KR" altLang="en-US" dirty="0" smtClean="0"/>
+              <a:t>결과 정리</a:t>
+            </a:r>
+            <a:endParaRPr lang="ko-KR" altLang="en-US" dirty="0"/>
+          </a:p>
+        </p:txBody>
+      </p:sp>
+      <p:sp>
+        <p:nvSpPr>
+          <p:cNvPr id="26" name="직사각형 25"/>
+          <p:cNvSpPr/>
+          <p:nvPr/>
+        </p:nvSpPr>
+        <p:spPr>
+          <a:xfrm>
+            <a:off x="641840" y="1318845"/>
+            <a:ext cx="4572000" cy="175846"/>
+          </a:xfrm>
+          <a:prstGeom prst="rect">
+            <a:avLst/>
+          </a:prstGeom>
+          <a:solidFill>
+            <a:srgbClr val="FFFF00"/>
+          </a:solidFill>
+          <a:ln>
+            <a:solidFill>
+              <a:srgbClr val="FFFF00"/>
+            </a:solidFill>
+          </a:ln>
+        </p:spPr>
+        <p:style>
+          <a:lnRef idx="2">
+            <a:schemeClr val="accent1">
+              <a:shade val="50000"/>
+            </a:schemeClr>
+          </a:lnRef>
+          <a:fillRef idx="1">
+            <a:schemeClr val="accent1"/>
+          </a:fillRef>
+          <a:effectRef idx="0">
+            <a:schemeClr val="accent1"/>
+          </a:effectRef>
+          <a:fontRef idx="minor">
+            <a:schemeClr val="lt1"/>
+          </a:fontRef>
+        </p:style>
+        <p:txBody>
+          <a:bodyPr rtlCol="0" anchor="ctr"/>
+          <a:lstStyle/>
+          <a:p>
+            <a:pPr algn="ctr"/>
+            <a:endParaRPr lang="ko-KR" altLang="en-US"/>
+          </a:p>
+        </p:txBody>
+      </p:sp>
+      <p:sp>
+        <p:nvSpPr>
+          <p:cNvPr id="27" name="직사각형 26"/>
+          <p:cNvSpPr/>
+          <p:nvPr/>
+        </p:nvSpPr>
+        <p:spPr>
+          <a:xfrm>
+            <a:off x="1556239" y="1600181"/>
+            <a:ext cx="5486401" cy="175846"/>
+          </a:xfrm>
+          <a:prstGeom prst="rect">
+            <a:avLst/>
+          </a:prstGeom>
+          <a:solidFill>
+            <a:srgbClr val="00B050"/>
+          </a:solidFill>
+          <a:ln>
+            <a:solidFill>
+              <a:srgbClr val="00B050"/>
+            </a:solidFill>
+          </a:ln>
+        </p:spPr>
+        <p:style>
+          <a:lnRef idx="2">
+            <a:schemeClr val="accent1">
+              <a:shade val="50000"/>
+            </a:schemeClr>
+          </a:lnRef>
+          <a:fillRef idx="1">
+            <a:schemeClr val="accent1"/>
+          </a:fillRef>
+          <a:effectRef idx="0">
+            <a:schemeClr val="accent1"/>
+          </a:effectRef>
+          <a:fontRef idx="minor">
+            <a:schemeClr val="lt1"/>
+          </a:fontRef>
+        </p:style>
+        <p:txBody>
+          <a:bodyPr rtlCol="0" anchor="ctr"/>
+          <a:lstStyle/>
+          <a:p>
+            <a:pPr algn="ctr"/>
+            <a:endParaRPr lang="ko-KR" altLang="en-US"/>
+          </a:p>
+        </p:txBody>
+      </p:sp>
+      <p:sp>
+        <p:nvSpPr>
+          <p:cNvPr id="28" name="직사각형 27"/>
+          <p:cNvSpPr/>
+          <p:nvPr/>
+        </p:nvSpPr>
+        <p:spPr>
+          <a:xfrm>
+            <a:off x="4299439" y="1861103"/>
+            <a:ext cx="3529100" cy="178693"/>
+          </a:xfrm>
+          <a:prstGeom prst="rect">
+            <a:avLst/>
+          </a:prstGeom>
+          <a:solidFill>
+            <a:srgbClr val="00B0F0"/>
+          </a:solidFill>
+          <a:ln>
+            <a:solidFill>
+              <a:srgbClr val="00B0F0"/>
+            </a:solidFill>
+          </a:ln>
+        </p:spPr>
+        <p:style>
+          <a:lnRef idx="2">
+            <a:schemeClr val="accent1">
+              <a:shade val="50000"/>
+            </a:schemeClr>
+          </a:lnRef>
+          <a:fillRef idx="1">
+            <a:schemeClr val="accent1"/>
+          </a:fillRef>
+          <a:effectRef idx="0">
+            <a:schemeClr val="accent1"/>
+          </a:effectRef>
+          <a:fontRef idx="minor">
+            <a:schemeClr val="lt1"/>
+          </a:fontRef>
+        </p:style>
+        <p:txBody>
+          <a:bodyPr rtlCol="0" anchor="ctr"/>
+          <a:lstStyle/>
+          <a:p>
+            <a:pPr algn="ctr"/>
+            <a:endParaRPr lang="ko-KR" altLang="en-US"/>
+          </a:p>
+        </p:txBody>
+      </p:sp>
+      <p:sp>
+        <p:nvSpPr>
+          <p:cNvPr id="29" name="직사각형 28"/>
+          <p:cNvSpPr/>
+          <p:nvPr/>
+        </p:nvSpPr>
+        <p:spPr>
+          <a:xfrm>
+            <a:off x="7042640" y="1316620"/>
+            <a:ext cx="2743200" cy="181747"/>
+          </a:xfrm>
+          <a:prstGeom prst="rect">
+            <a:avLst/>
+          </a:prstGeom>
+          <a:solidFill>
+            <a:srgbClr val="7030A0"/>
+          </a:solidFill>
+          <a:ln>
+            <a:solidFill>
+              <a:srgbClr val="7030A0"/>
+            </a:solidFill>
+          </a:ln>
+        </p:spPr>
+        <p:style>
+          <a:lnRef idx="2">
+            <a:schemeClr val="accent1">
+              <a:shade val="50000"/>
+            </a:schemeClr>
+          </a:lnRef>
+          <a:fillRef idx="1">
+            <a:schemeClr val="accent1"/>
+          </a:fillRef>
+          <a:effectRef idx="0">
+            <a:schemeClr val="accent1"/>
+          </a:effectRef>
+          <a:fontRef idx="minor">
+            <a:schemeClr val="lt1"/>
+          </a:fontRef>
+        </p:style>
+        <p:txBody>
+          <a:bodyPr rtlCol="0" anchor="ctr"/>
+          <a:lstStyle/>
+          <a:p>
+            <a:pPr algn="ctr"/>
+            <a:endParaRPr lang="ko-KR" altLang="en-US"/>
+          </a:p>
+        </p:txBody>
+      </p:sp>
+      <p:sp>
+        <p:nvSpPr>
+          <p:cNvPr id="30" name="직사각형 29"/>
+          <p:cNvSpPr/>
+          <p:nvPr/>
+        </p:nvSpPr>
+        <p:spPr>
+          <a:xfrm>
+            <a:off x="8871440" y="1602243"/>
+            <a:ext cx="1828799" cy="173784"/>
+          </a:xfrm>
+          <a:prstGeom prst="rect">
+            <a:avLst/>
+          </a:prstGeom>
+          <a:solidFill>
+            <a:schemeClr val="accent2">
+              <a:lumMod val="50000"/>
+            </a:schemeClr>
+          </a:solidFill>
+          <a:ln>
+            <a:solidFill>
+              <a:schemeClr val="accent2">
+                <a:lumMod val="50000"/>
+              </a:schemeClr>
+            </a:solidFill>
+          </a:ln>
+        </p:spPr>
+        <p:style>
+          <a:lnRef idx="2">
+            <a:schemeClr val="accent1">
+              <a:shade val="50000"/>
+            </a:schemeClr>
+          </a:lnRef>
+          <a:fillRef idx="1">
+            <a:schemeClr val="accent1"/>
+          </a:fillRef>
+          <a:effectRef idx="0">
+            <a:schemeClr val="accent1"/>
+          </a:effectRef>
+          <a:fontRef idx="minor">
+            <a:schemeClr val="lt1"/>
+          </a:fontRef>
+        </p:style>
+        <p:txBody>
+          <a:bodyPr rtlCol="0" anchor="ctr"/>
+          <a:lstStyle/>
+          <a:p>
+            <a:pPr algn="ctr"/>
+            <a:endParaRPr lang="ko-KR" altLang="en-US"/>
+          </a:p>
+        </p:txBody>
+      </p:sp>
+      <p:cxnSp>
+        <p:nvCxnSpPr>
+          <p:cNvPr id="32" name="직선 연결선 31"/>
+          <p:cNvCxnSpPr/>
+          <p:nvPr/>
+        </p:nvCxnSpPr>
+        <p:spPr>
+          <a:xfrm>
+            <a:off x="641840" y="219812"/>
+            <a:ext cx="0" cy="1819984"/>
+          </a:xfrm>
+          <a:prstGeom prst="line">
+            <a:avLst/>
+          </a:prstGeom>
+          <a:ln w="57150"/>
+        </p:spPr>
+        <p:style>
+          <a:lnRef idx="1">
+            <a:schemeClr val="dk1"/>
+          </a:lnRef>
+          <a:fillRef idx="0">
+            <a:schemeClr val="dk1"/>
+          </a:fillRef>
+          <a:effectRef idx="0">
+            <a:schemeClr val="dk1"/>
+          </a:effectRef>
+          <a:fontRef idx="minor">
+            <a:schemeClr val="tx1"/>
+          </a:fontRef>
+        </p:style>
+      </p:cxnSp>
+      <p:cxnSp>
+        <p:nvCxnSpPr>
+          <p:cNvPr id="34" name="직선 연결선 33"/>
+          <p:cNvCxnSpPr/>
+          <p:nvPr/>
+        </p:nvCxnSpPr>
+        <p:spPr>
+          <a:xfrm>
+            <a:off x="11614640" y="217627"/>
+            <a:ext cx="0" cy="1822169"/>
+          </a:xfrm>
+          <a:prstGeom prst="line">
+            <a:avLst/>
+          </a:prstGeom>
+          <a:ln w="57150"/>
+        </p:spPr>
+        <p:style>
+          <a:lnRef idx="1">
+            <a:schemeClr val="dk1"/>
+          </a:lnRef>
+          <a:fillRef idx="0">
+            <a:schemeClr val="dk1"/>
+          </a:fillRef>
+          <a:effectRef idx="0">
+            <a:schemeClr val="dk1"/>
+          </a:effectRef>
+          <a:fontRef idx="minor">
+            <a:schemeClr val="tx1"/>
+          </a:fontRef>
+        </p:style>
+      </p:cxnSp>
+    </p:spTree>
+    <p:extLst>
+      <p:ext uri="{BB962C8B-B14F-4D97-AF65-F5344CB8AC3E}">
+        <p14:creationId xmlns:p14="http://schemas.microsoft.com/office/powerpoint/2010/main" val="736793217"/>
+      </p:ext>
+    </p:extLst>
+  </p:cSld>
+  <p:clrMapOvr>
+    <a:masterClrMapping/>
+  </p:clrMapOvr>
+</p:sld>
+</file>
+
+<file path=ppt/slides/slide3.xml><?xml version="1.0" encoding="utf-8"?>
+<p:sld xmlns:a="http://schemas.openxmlformats.org/drawingml/2006/main" xmlns:r="http://schemas.openxmlformats.org/officeDocument/2006/relationships" xmlns:p="http://schemas.openxmlformats.org/presentationml/2006/main">
+  <p:cSld>
+    <p:spTree>
+      <p:nvGrpSpPr>
+        <p:cNvPr id="1" name=""/>
+        <p:cNvGrpSpPr/>
+        <p:nvPr/>
+      </p:nvGrpSpPr>
+      <p:grpSpPr>
+        <a:xfrm>
+          <a:off x="0" y="0"/>
+          <a:ext cx="0" cy="0"/>
+          <a:chOff x="0" y="0"/>
+          <a:chExt cx="0" cy="0"/>
+        </a:xfrm>
+      </p:grpSpPr>
+      <p:sp>
+        <p:nvSpPr>
+          <p:cNvPr id="4" name="TextBox 3"/>
+          <p:cNvSpPr txBox="1"/>
+          <p:nvPr/>
+        </p:nvSpPr>
+        <p:spPr>
+          <a:xfrm>
+            <a:off x="931652" y="577970"/>
+            <a:ext cx="1189749" cy="369332"/>
+          </a:xfrm>
+          <a:prstGeom prst="rect">
+            <a:avLst/>
+          </a:prstGeom>
+          <a:noFill/>
+        </p:spPr>
+        <p:txBody>
+          <a:bodyPr wrap="none" rtlCol="0">
+            <a:spAutoFit/>
+          </a:bodyPr>
+          <a:lstStyle/>
+          <a:p>
+            <a:r>
+              <a:rPr lang="ko-KR" altLang="en-US" smtClean="0"/>
+              <a:t>작동 과정</a:t>
+            </a:r>
+            <a:endParaRPr lang="ko-KR" altLang="en-US"/>
+          </a:p>
+        </p:txBody>
+      </p:sp>
+      <p:sp>
+        <p:nvSpPr>
+          <p:cNvPr id="5" name="TextBox 4"/>
+          <p:cNvSpPr txBox="1"/>
+          <p:nvPr/>
+        </p:nvSpPr>
+        <p:spPr>
+          <a:xfrm>
+            <a:off x="931652" y="1329312"/>
+            <a:ext cx="6625532" cy="3970318"/>
+          </a:xfrm>
+          <a:prstGeom prst="rect">
+            <a:avLst/>
+          </a:prstGeom>
+          <a:noFill/>
+        </p:spPr>
+        <p:txBody>
+          <a:bodyPr wrap="none" rtlCol="0">
+            <a:spAutoFit/>
+          </a:bodyPr>
+          <a:lstStyle/>
+          <a:p>
+            <a:r>
               <a:rPr lang="en-US" altLang="ko-KR" sz="1400" dirty="0" smtClean="0"/>
               <a:t>n</a:t>
             </a:r>
@@ -4647,11 +6322,7 @@
             </a:r>
             <a:r>
               <a:rPr lang="ko-KR" altLang="en-US" sz="1400" dirty="0" smtClean="0"/>
-              <a:t>초 간격으로 두 번 깜빡이고 </a:t>
-            </a:r>
-            <a:r>
-              <a:rPr lang="ko-KR" altLang="en-US" sz="1400" dirty="0" smtClean="0"/>
-              <a:t>소등</a:t>
+              <a:t>초 간격으로 두 번 깜빡이고 소등</a:t>
             </a:r>
             <a:endParaRPr lang="en-US" altLang="ko-KR" sz="1400" dirty="0" smtClean="0"/>
           </a:p>
@@ -4748,11 +6419,7 @@
           <a:p>
             <a:r>
               <a:rPr lang="ko-KR" altLang="en-US" sz="1400" dirty="0" smtClean="0"/>
-              <a:t>점등 시간 안에 해당하는 버튼을 누르지 못했을 경우 </a:t>
-            </a:r>
-            <a:r>
-              <a:rPr lang="ko-KR" altLang="en-US" sz="1400" dirty="0" smtClean="0"/>
-              <a:t>소등</a:t>
+              <a:t>점등 시간 안에 해당하는 버튼을 누르지 못했을 경우 소등</a:t>
             </a:r>
             <a:endParaRPr lang="en-US" altLang="ko-KR" sz="1400" dirty="0" smtClean="0"/>
           </a:p>

</xml_diff>